<commit_message>
Atualizado teste da classe de posicionamento
</commit_message>
<xml_diff>
--- a/Docs/calculo_posicionamento.pptx
+++ b/Docs/calculo_posicionamento.pptx
@@ -3479,6 +3479,66 @@
       <p:grpSpPr/>
       <p:sp>
         <p:nvSpPr>
+          <p:cNvPr id="9" name="Text Box 8"/>
+          <p:cNvSpPr txBox="1"/>
+          <p:nvPr/>
+        </p:nvSpPr>
+        <p:spPr>
+          <a:xfrm>
+            <a:off x="618490" y="1530985"/>
+            <a:ext cx="5044440" cy="2030095"/>
+          </a:xfrm>
+          <a:prstGeom prst="rect">
+            <a:avLst/>
+          </a:prstGeom>
+          <a:noFill/>
+        </p:spPr>
+        <p:txBody>
+          <a:bodyPr wrap="square" rtlCol="0">
+            <a:spAutoFit/>
+          </a:bodyPr>
+          <a:p>
+            <a:r>
+              <a:rPr lang="en-US" altLang="en-US"/>
+              <a:t>S2</a:t>
+            </a:r>
+            <a:endParaRPr lang="en-US" altLang="en-US"/>
+          </a:p>
+          <a:p>
+            <a:r>
+              <a:rPr lang="en-US" altLang="en-US"/>
+              <a:t>coseno = ca/h</a:t>
+            </a:r>
+            <a:endParaRPr lang="en-US" altLang="en-US"/>
+          </a:p>
+          <a:p>
+            <a:r>
+              <a:rPr lang="en-US" altLang="en-US"/>
+              <a:t>seno = co/h</a:t>
+            </a:r>
+            <a:endParaRPr lang="en-US" altLang="en-US"/>
+          </a:p>
+          <a:p>
+            <a:endParaRPr lang="en-US" altLang="en-US"/>
+          </a:p>
+          <a:p>
+            <a:r>
+              <a:rPr lang="en-US" altLang="en-US"/>
+              <a:t>x_s2 = distancia *seno (angulo)</a:t>
+            </a:r>
+            <a:endParaRPr lang="en-US" altLang="en-US"/>
+          </a:p>
+          <a:p>
+            <a:r>
+              <a:rPr lang="en-US" altLang="en-US"/>
+              <a:t>y_S2 = distancia_total_S1_S2 - (distancia * coseno(angulo))</a:t>
+            </a:r>
+            <a:endParaRPr lang="en-US" altLang="en-US"/>
+          </a:p>
+        </p:txBody>
+      </p:sp>
+      <p:sp>
+        <p:nvSpPr>
           <p:cNvPr id="4" name="Oval 3"/>
           <p:cNvSpPr/>
           <p:nvPr/>
@@ -3513,10 +3573,10 @@
           <a:p>
             <a:pPr algn="ctr"/>
             <a:r>
-              <a:rPr lang="" altLang="en-US"/>
+              <a:rPr lang="en-US" altLang="en-US"/>
               <a:t>2</a:t>
             </a:r>
-            <a:endParaRPr lang="" altLang="en-US"/>
+            <a:endParaRPr lang="en-US" altLang="en-US"/>
           </a:p>
         </p:txBody>
       </p:sp>
@@ -3556,10 +3616,10 @@
           <a:p>
             <a:pPr algn="ctr"/>
             <a:r>
-              <a:rPr lang="" altLang="en-US"/>
+              <a:rPr lang="en-US" altLang="en-US"/>
               <a:t>1</a:t>
             </a:r>
-            <a:endParaRPr lang="" altLang="en-US"/>
+            <a:endParaRPr lang="en-US" altLang="en-US"/>
           </a:p>
         </p:txBody>
       </p:sp>
@@ -3599,10 +3659,10 @@
           <a:p>
             <a:pPr algn="ctr"/>
             <a:r>
-              <a:rPr lang="" altLang="en-US"/>
+              <a:rPr lang="en-US" altLang="en-US"/>
               <a:t>3</a:t>
             </a:r>
-            <a:endParaRPr lang="" altLang="en-US"/>
+            <a:endParaRPr lang="en-US" altLang="en-US"/>
           </a:p>
         </p:txBody>
       </p:sp>
@@ -3614,7 +3674,7 @@
         </p:nvSpPr>
         <p:spPr>
           <a:xfrm>
-            <a:off x="3020060" y="2196465"/>
+            <a:off x="1886585" y="1811020"/>
             <a:ext cx="241300" cy="211455"/>
           </a:xfrm>
           <a:prstGeom prst="ellipse">
@@ -3667,54 +3727,54 @@
           </a:bodyPr>
           <a:p>
             <a:r>
-              <a:rPr lang="" altLang="en-US"/>
+              <a:rPr lang="en-US" altLang="en-US"/>
               <a:t>S1</a:t>
             </a:r>
-            <a:endParaRPr lang="" altLang="en-US"/>
-          </a:p>
-          <a:p>
-            <a:r>
-              <a:rPr lang="" altLang="en-US"/>
+            <a:endParaRPr lang="en-US" altLang="en-US"/>
+          </a:p>
+          <a:p>
+            <a:r>
+              <a:rPr lang="en-US" altLang="en-US"/>
               <a:t>coseno = ca/h</a:t>
             </a:r>
-            <a:endParaRPr lang="" altLang="en-US"/>
-          </a:p>
-          <a:p>
-            <a:r>
-              <a:rPr lang="" altLang="en-US"/>
+            <a:endParaRPr lang="en-US" altLang="en-US"/>
+          </a:p>
+          <a:p>
+            <a:r>
+              <a:rPr lang="en-US" altLang="en-US"/>
               <a:t>seno = co/h</a:t>
             </a:r>
-            <a:endParaRPr lang="" altLang="en-US"/>
-          </a:p>
-          <a:p>
-            <a:r>
-              <a:rPr lang="" altLang="en-US"/>
+            <a:endParaRPr lang="en-US" altLang="en-US"/>
+          </a:p>
+          <a:p>
+            <a:r>
+              <a:rPr lang="en-US" altLang="en-US"/>
               <a:t>x_S1 = distancia*coseno (angulo)</a:t>
             </a:r>
-            <a:endParaRPr lang="" altLang="en-US"/>
-          </a:p>
-          <a:p>
-            <a:endParaRPr lang="" altLang="en-US"/>
-          </a:p>
-          <a:p>
-            <a:r>
-              <a:rPr lang="" altLang="en-US"/>
+            <a:endParaRPr lang="en-US" altLang="en-US"/>
+          </a:p>
+          <a:p>
+            <a:endParaRPr lang="en-US" altLang="en-US"/>
+          </a:p>
+          <a:p>
+            <a:r>
+              <a:rPr lang="en-US" altLang="en-US"/>
               <a:t>y_S1 = distancia*seno(angulo)</a:t>
             </a:r>
-            <a:endParaRPr lang="" altLang="en-US"/>
-          </a:p>
-        </p:txBody>
-      </p:sp>
-      <p:sp>
-        <p:nvSpPr>
-          <p:cNvPr id="9" name="Text Box 8"/>
+            <a:endParaRPr lang="en-US" altLang="en-US"/>
+          </a:p>
+        </p:txBody>
+      </p:sp>
+      <p:sp>
+        <p:nvSpPr>
+          <p:cNvPr id="10" name="Text Box 9"/>
           <p:cNvSpPr txBox="1"/>
           <p:nvPr/>
         </p:nvSpPr>
         <p:spPr>
           <a:xfrm>
-            <a:off x="618490" y="1530985"/>
-            <a:ext cx="5044440" cy="2030095"/>
+            <a:off x="7135495" y="1129665"/>
+            <a:ext cx="5044440" cy="2306955"/>
           </a:xfrm>
           <a:prstGeom prst="rect">
             <a:avLst/>
@@ -3728,11 +3788,7 @@
           <a:p>
             <a:r>
               <a:rPr lang="en-US" altLang="en-US"/>
-              <a:t>S</a:t>
-            </a:r>
-            <a:r>
-              <a:rPr lang="" altLang="en-US"/>
-              <a:t>2</a:t>
+              <a:t>S3</a:t>
             </a:r>
             <a:endParaRPr lang="en-US" altLang="en-US"/>
           </a:p>
@@ -3755,110 +3811,205 @@
           </a:p>
           <a:p>
             <a:r>
-              <a:rPr lang="" altLang="en-US"/>
-              <a:t>x_s2 = distancia *seno (angulo)</a:t>
-            </a:r>
-            <a:endParaRPr lang="" altLang="en-US"/>
-          </a:p>
-          <a:p>
-            <a:r>
-              <a:rPr lang="" altLang="en-US"/>
-              <a:t>y_S2 = distancia_total_S1_S2 - (distancia * coseno(angulo))</a:t>
-            </a:r>
-            <a:endParaRPr lang="" altLang="en-US"/>
-          </a:p>
-        </p:txBody>
-      </p:sp>
-      <p:sp>
-        <p:nvSpPr>
-          <p:cNvPr id="10" name="Text Box 9"/>
-          <p:cNvSpPr txBox="1"/>
-          <p:nvPr/>
-        </p:nvSpPr>
-        <p:spPr>
-          <a:xfrm>
-            <a:off x="7135495" y="1129665"/>
-            <a:ext cx="5044440" cy="2306955"/>
-          </a:xfrm>
-          <a:prstGeom prst="rect">
-            <a:avLst/>
-          </a:prstGeom>
-          <a:noFill/>
-        </p:spPr>
-        <p:txBody>
-          <a:bodyPr wrap="square" rtlCol="0">
-            <a:spAutoFit/>
-          </a:bodyPr>
-          <a:p>
-            <a:r>
               <a:rPr lang="en-US" altLang="en-US"/>
-              <a:t>S</a:t>
-            </a:r>
-            <a:r>
-              <a:rPr lang="" altLang="en-US"/>
-              <a:t>3</a:t>
-            </a:r>
-            <a:endParaRPr lang="" altLang="en-US"/>
+              <a:t>x_s3 = distancia_total_S2_S3 - (distancia * coseno(angulo))</a:t>
+            </a:r>
+            <a:endParaRPr lang="en-US" altLang="en-US"/>
           </a:p>
           <a:p>
             <a:r>
               <a:rPr lang="en-US" altLang="en-US"/>
-              <a:t>coseno = ca/h</a:t>
-            </a:r>
-            <a:endParaRPr lang="en-US" altLang="en-US"/>
-          </a:p>
-          <a:p>
-            <a:r>
-              <a:rPr lang="en-US" altLang="en-US"/>
-              <a:t>seno = co/h</a:t>
-            </a:r>
-            <a:endParaRPr lang="en-US" altLang="en-US"/>
-          </a:p>
-          <a:p>
-            <a:endParaRPr lang="en-US" altLang="en-US"/>
-          </a:p>
-          <a:p>
-            <a:r>
-              <a:rPr lang="en-US" altLang="en-US"/>
-              <a:t>x_s</a:t>
-            </a:r>
-            <a:r>
-              <a:rPr lang="" altLang="en-US"/>
-              <a:t>3</a:t>
-            </a:r>
-            <a:r>
-              <a:rPr lang="en-US" altLang="en-US"/>
-              <a:t> = </a:t>
-            </a:r>
-            <a:r>
-              <a:rPr lang="" altLang="en-US"/>
-              <a:t>distancia_total_S2_S3 - (distancia * coseno(angulo))</a:t>
-            </a:r>
-            <a:endParaRPr lang="" altLang="en-US"/>
-          </a:p>
-          <a:p>
-            <a:r>
-              <a:rPr lang="" altLang="en-US"/>
               <a:t>y_S3 = </a:t>
             </a:r>
             <a:r>
               <a:rPr lang="en-US" altLang="en-US">
                 <a:sym typeface="+mn-ea"/>
               </a:rPr>
-              <a:t>distancia_total_S1_S2 - </a:t>
-            </a:r>
-            <a:r>
-              <a:rPr lang="" altLang="en-US">
-                <a:sym typeface="+mn-ea"/>
-              </a:rPr>
-              <a:t>(distancia * seno(angulo))</a:t>
-            </a:r>
-            <a:endParaRPr lang="" altLang="en-US">
+              <a:t>distancia_total_S1_S2 - (distancia * seno(angulo))</a:t>
+            </a:r>
+            <a:endParaRPr lang="en-US" altLang="en-US">
               <a:sym typeface="+mn-ea"/>
             </a:endParaRPr>
           </a:p>
         </p:txBody>
       </p:sp>
+      <p:sp>
+        <p:nvSpPr>
+          <p:cNvPr id="2" name="Oval 1"/>
+          <p:cNvSpPr/>
+          <p:nvPr/>
+        </p:nvSpPr>
+        <p:spPr>
+          <a:xfrm>
+            <a:off x="5517515" y="2022475"/>
+            <a:ext cx="145415" cy="173990"/>
+          </a:xfrm>
+          <a:prstGeom prst="ellipse">
+            <a:avLst/>
+          </a:prstGeom>
+        </p:spPr>
+        <p:style>
+          <a:lnRef idx="2">
+            <a:schemeClr val="accent2">
+              <a:shade val="50000"/>
+            </a:schemeClr>
+          </a:lnRef>
+          <a:fillRef idx="1">
+            <a:schemeClr val="accent2"/>
+          </a:fillRef>
+          <a:effectRef idx="0">
+            <a:schemeClr val="accent2"/>
+          </a:effectRef>
+          <a:fontRef idx="minor">
+            <a:schemeClr val="lt1"/>
+          </a:fontRef>
+        </p:style>
+        <p:txBody>
+          <a:bodyPr rtlCol="0" anchor="ctr"/>
+          <a:p>
+            <a:pPr algn="ctr"/>
+            <a:endParaRPr lang="en-US"/>
+          </a:p>
+        </p:txBody>
+      </p:sp>
+      <p:sp>
+        <p:nvSpPr>
+          <p:cNvPr id="3" name="Oval 2"/>
+          <p:cNvSpPr/>
+          <p:nvPr/>
+        </p:nvSpPr>
+        <p:spPr>
+          <a:xfrm>
+            <a:off x="5517515" y="3561080"/>
+            <a:ext cx="145415" cy="173990"/>
+          </a:xfrm>
+          <a:prstGeom prst="ellipse">
+            <a:avLst/>
+          </a:prstGeom>
+        </p:spPr>
+        <p:style>
+          <a:lnRef idx="2">
+            <a:schemeClr val="accent2">
+              <a:shade val="50000"/>
+            </a:schemeClr>
+          </a:lnRef>
+          <a:fillRef idx="1">
+            <a:schemeClr val="accent2"/>
+          </a:fillRef>
+          <a:effectRef idx="0">
+            <a:schemeClr val="accent2"/>
+          </a:effectRef>
+          <a:fontRef idx="minor">
+            <a:schemeClr val="lt1"/>
+          </a:fontRef>
+        </p:style>
+        <p:txBody>
+          <a:bodyPr rtlCol="0" anchor="ctr"/>
+          <a:p>
+            <a:pPr algn="ctr"/>
+            <a:endParaRPr lang="en-US"/>
+          </a:p>
+        </p:txBody>
+      </p:sp>
+      <p:cxnSp>
+        <p:nvCxnSpPr>
+          <p:cNvPr id="11" name="Straight Arrow Connector 10"/>
+          <p:cNvCxnSpPr/>
+          <p:nvPr/>
+        </p:nvCxnSpPr>
+        <p:spPr>
+          <a:xfrm>
+            <a:off x="1525270" y="1437640"/>
+            <a:ext cx="290830" cy="334010"/>
+          </a:xfrm>
+          <a:prstGeom prst="straightConnector1">
+            <a:avLst/>
+          </a:prstGeom>
+          <a:ln>
+            <a:tailEnd type="arrow"/>
+          </a:ln>
+        </p:spPr>
+        <p:style>
+          <a:lnRef idx="1">
+            <a:schemeClr val="accent1"/>
+          </a:lnRef>
+          <a:fillRef idx="0">
+            <a:schemeClr val="accent1"/>
+          </a:fillRef>
+          <a:effectRef idx="0">
+            <a:schemeClr val="accent1"/>
+          </a:effectRef>
+          <a:fontRef idx="minor">
+            <a:schemeClr val="tx1"/>
+          </a:fontRef>
+        </p:style>
+      </p:cxnSp>
+      <p:cxnSp>
+        <p:nvCxnSpPr>
+          <p:cNvPr id="12" name="Straight Arrow Connector 11"/>
+          <p:cNvCxnSpPr/>
+          <p:nvPr/>
+        </p:nvCxnSpPr>
+        <p:spPr>
+          <a:xfrm flipH="1">
+            <a:off x="5724525" y="1466850"/>
+            <a:ext cx="508635" cy="494030"/>
+          </a:xfrm>
+          <a:prstGeom prst="straightConnector1">
+            <a:avLst/>
+          </a:prstGeom>
+          <a:ln>
+            <a:tailEnd type="arrow"/>
+          </a:ln>
+        </p:spPr>
+        <p:style>
+          <a:lnRef idx="1">
+            <a:schemeClr val="accent1"/>
+          </a:lnRef>
+          <a:fillRef idx="0">
+            <a:schemeClr val="accent1"/>
+          </a:fillRef>
+          <a:effectRef idx="0">
+            <a:schemeClr val="accent1"/>
+          </a:effectRef>
+          <a:fontRef idx="minor">
+            <a:schemeClr val="tx1"/>
+          </a:fontRef>
+        </p:style>
+      </p:cxnSp>
+      <p:cxnSp>
+        <p:nvCxnSpPr>
+          <p:cNvPr id="13" name="Straight Arrow Connector 12"/>
+          <p:cNvCxnSpPr/>
+          <p:nvPr/>
+        </p:nvCxnSpPr>
+        <p:spPr>
+          <a:xfrm flipV="1">
+            <a:off x="1816100" y="3703955"/>
+            <a:ext cx="3545205" cy="639445"/>
+          </a:xfrm>
+          <a:prstGeom prst="straightConnector1">
+            <a:avLst/>
+          </a:prstGeom>
+          <a:ln>
+            <a:tailEnd type="arrow"/>
+          </a:ln>
+        </p:spPr>
+        <p:style>
+          <a:lnRef idx="1">
+            <a:schemeClr val="accent1"/>
+          </a:lnRef>
+          <a:fillRef idx="0">
+            <a:schemeClr val="accent1"/>
+          </a:fillRef>
+          <a:effectRef idx="0">
+            <a:schemeClr val="accent1"/>
+          </a:effectRef>
+          <a:fontRef idx="minor">
+            <a:schemeClr val="tx1"/>
+          </a:fontRef>
+        </p:style>
+      </p:cxnSp>
     </p:spTree>
   </p:cSld>
   <p:clrMapOvr>

</xml_diff>